<commit_message>
new rules, excel files, etc
</commit_message>
<xml_diff>
--- a/Slides/WekaSlides.pptx
+++ b/Slides/WekaSlides.pptx
@@ -112,6 +112,11 @@
       </a:defRPr>
     </a:lvl9pPr>
   </p:defaultTextStyle>
+  <p:extLst>
+    <p:ext uri="{EFAFB233-063F-42B5-8137-9DF3F51BA10A}">
+      <p15:sldGuideLst xmlns:p15="http://schemas.microsoft.com/office/powerpoint/2012/main"/>
+    </p:ext>
+  </p:extLst>
 </p:presentation>
 </file>
 
@@ -3534,6 +3539,13 @@
             </a:r>
           </a:p>
           <a:p>
+            <a:pPr lvl="1"/>
+            <a:r>
+              <a:rPr lang="en-US" dirty="0"/>
+              <a:t>Set the consequent to the Injury Type which outputs Confidence only</a:t>
+            </a:r>
+          </a:p>
+          <a:p>
             <a:endParaRPr lang="en-US" dirty="0"/>
           </a:p>
           <a:p>
@@ -3697,8 +3709,8 @@
         </p:nvSpPr>
         <p:spPr>
           <a:xfrm>
-            <a:off x="838200" y="1359017"/>
-            <a:ext cx="10515600" cy="4817946"/>
+            <a:off x="838200" y="1359016"/>
+            <a:ext cx="10515600" cy="5142451"/>
           </a:xfrm>
         </p:spPr>
         <p:txBody>
@@ -3713,10 +3725,21 @@
             </a:r>
           </a:p>
           <a:p>
+            <a:pPr lvl="1"/>
+            <a:r>
+              <a:rPr lang="en-US" sz="2000" dirty="0"/>
+              <a:t>Crashing into an animal always resulted in a Fatal injury</a:t>
+            </a:r>
+          </a:p>
+          <a:p>
             <a:r>
               <a:rPr lang="en-US" sz="2400" dirty="0"/>
               <a:t>PRIM_CONTRIBUTORY_CAUSE=OPERATING VEHICLE IN ERRATIC, RECKLESS, CARELESS, NEGLIGENT OR AGGRESSIVE MANNER POSTED_SPEED_LIMIT=SPEED LIMIT 15 DEVICE_CONDITION=NO CONTROLS FIRST_CRASH_TYPE=PEDESTRIAN 2 ==&gt; MOST_SEVERE_INJURY=INCAPACITATING INJURY</a:t>
             </a:r>
+          </a:p>
+          <a:p>
+            <a:pPr lvl="1"/>
+            <a:endParaRPr lang="en-US" sz="2000" dirty="0"/>
           </a:p>
           <a:p>
             <a:r>

</xml_diff>

<commit_message>
Fix for images on slides
</commit_message>
<xml_diff>
--- a/Slides/WekaSlides.pptx
+++ b/Slides/WekaSlides.pptx
@@ -274,7 +274,7 @@
           <a:p>
             <a:fld id="{679C5861-3D33-4114-B862-03C5384013CF}" type="datetimeFigureOut">
               <a:rPr lang="en-US" smtClean="0"/>
-              <a:t>12/3/2018</a:t>
+              <a:t>12/4/2018</a:t>
             </a:fld>
             <a:endParaRPr lang="en-US"/>
           </a:p>
@@ -472,7 +472,7 @@
           <a:p>
             <a:fld id="{679C5861-3D33-4114-B862-03C5384013CF}" type="datetimeFigureOut">
               <a:rPr lang="en-US" smtClean="0"/>
-              <a:t>12/3/2018</a:t>
+              <a:t>12/4/2018</a:t>
             </a:fld>
             <a:endParaRPr lang="en-US"/>
           </a:p>
@@ -680,7 +680,7 @@
           <a:p>
             <a:fld id="{679C5861-3D33-4114-B862-03C5384013CF}" type="datetimeFigureOut">
               <a:rPr lang="en-US" smtClean="0"/>
-              <a:t>12/3/2018</a:t>
+              <a:t>12/4/2018</a:t>
             </a:fld>
             <a:endParaRPr lang="en-US"/>
           </a:p>
@@ -878,7 +878,7 @@
           <a:p>
             <a:fld id="{679C5861-3D33-4114-B862-03C5384013CF}" type="datetimeFigureOut">
               <a:rPr lang="en-US" smtClean="0"/>
-              <a:t>12/3/2018</a:t>
+              <a:t>12/4/2018</a:t>
             </a:fld>
             <a:endParaRPr lang="en-US"/>
           </a:p>
@@ -1153,7 +1153,7 @@
           <a:p>
             <a:fld id="{679C5861-3D33-4114-B862-03C5384013CF}" type="datetimeFigureOut">
               <a:rPr lang="en-US" smtClean="0"/>
-              <a:t>12/3/2018</a:t>
+              <a:t>12/4/2018</a:t>
             </a:fld>
             <a:endParaRPr lang="en-US"/>
           </a:p>
@@ -1418,7 +1418,7 @@
           <a:p>
             <a:fld id="{679C5861-3D33-4114-B862-03C5384013CF}" type="datetimeFigureOut">
               <a:rPr lang="en-US" smtClean="0"/>
-              <a:t>12/3/2018</a:t>
+              <a:t>12/4/2018</a:t>
             </a:fld>
             <a:endParaRPr lang="en-US"/>
           </a:p>
@@ -1830,7 +1830,7 @@
           <a:p>
             <a:fld id="{679C5861-3D33-4114-B862-03C5384013CF}" type="datetimeFigureOut">
               <a:rPr lang="en-US" smtClean="0"/>
-              <a:t>12/3/2018</a:t>
+              <a:t>12/4/2018</a:t>
             </a:fld>
             <a:endParaRPr lang="en-US"/>
           </a:p>
@@ -1971,7 +1971,7 @@
           <a:p>
             <a:fld id="{679C5861-3D33-4114-B862-03C5384013CF}" type="datetimeFigureOut">
               <a:rPr lang="en-US" smtClean="0"/>
-              <a:t>12/3/2018</a:t>
+              <a:t>12/4/2018</a:t>
             </a:fld>
             <a:endParaRPr lang="en-US"/>
           </a:p>
@@ -2084,7 +2084,7 @@
           <a:p>
             <a:fld id="{679C5861-3D33-4114-B862-03C5384013CF}" type="datetimeFigureOut">
               <a:rPr lang="en-US" smtClean="0"/>
-              <a:t>12/3/2018</a:t>
+              <a:t>12/4/2018</a:t>
             </a:fld>
             <a:endParaRPr lang="en-US"/>
           </a:p>
@@ -2395,7 +2395,7 @@
           <a:p>
             <a:fld id="{679C5861-3D33-4114-B862-03C5384013CF}" type="datetimeFigureOut">
               <a:rPr lang="en-US" smtClean="0"/>
-              <a:t>12/3/2018</a:t>
+              <a:t>12/4/2018</a:t>
             </a:fld>
             <a:endParaRPr lang="en-US"/>
           </a:p>
@@ -2683,7 +2683,7 @@
           <a:p>
             <a:fld id="{679C5861-3D33-4114-B862-03C5384013CF}" type="datetimeFigureOut">
               <a:rPr lang="en-US" smtClean="0"/>
-              <a:t>12/3/2018</a:t>
+              <a:t>12/4/2018</a:t>
             </a:fld>
             <a:endParaRPr lang="en-US"/>
           </a:p>
@@ -2924,7 +2924,7 @@
           <a:p>
             <a:fld id="{679C5861-3D33-4114-B862-03C5384013CF}" type="datetimeFigureOut">
               <a:rPr lang="en-US" smtClean="0"/>
-              <a:t>12/3/2018</a:t>
+              <a:t>12/4/2018</a:t>
             </a:fld>
             <a:endParaRPr lang="en-US"/>
           </a:p>
@@ -3492,42 +3492,42 @@
             <a:pPr lvl="1"/>
             <a:r>
               <a:rPr lang="en-US" dirty="0"/>
-              <a:t>99.2% correct classified, .07% incorrectly classified</a:t>
-            </a:r>
-          </a:p>
-          <a:p>
-            <a:pPr lvl="1"/>
-            <a:r>
-              <a:rPr lang="en-US" dirty="0"/>
-              <a:t>Precision = . 993</a:t>
-            </a:r>
-          </a:p>
-          <a:p>
-            <a:pPr lvl="1"/>
-            <a:r>
-              <a:rPr lang="en-US" dirty="0"/>
-              <a:t>Recall = .993</a:t>
-            </a:r>
-          </a:p>
-          <a:p>
-            <a:pPr lvl="1"/>
-            <a:r>
-              <a:rPr lang="en-US" dirty="0"/>
-              <a:t>F Measure = .993</a:t>
-            </a:r>
-          </a:p>
-          <a:p>
-            <a:pPr lvl="1"/>
-            <a:r>
-              <a:rPr lang="en-US" dirty="0"/>
-              <a:t>18 seconds to build model</a:t>
-            </a:r>
-          </a:p>
-          <a:p>
-            <a:pPr lvl="1"/>
-            <a:r>
-              <a:rPr lang="en-US" dirty="0"/>
-              <a:t>About 3 minutes to classify</a:t>
+              <a:t>98% correct classified, 2% incorrectly classified</a:t>
+            </a:r>
+          </a:p>
+          <a:p>
+            <a:pPr lvl="1"/>
+            <a:r>
+              <a:rPr lang="en-US" dirty="0"/>
+              <a:t>Precision = . 980</a:t>
+            </a:r>
+          </a:p>
+          <a:p>
+            <a:pPr lvl="1"/>
+            <a:r>
+              <a:rPr lang="en-US" dirty="0"/>
+              <a:t>Recall = .980</a:t>
+            </a:r>
+          </a:p>
+          <a:p>
+            <a:pPr lvl="1"/>
+            <a:r>
+              <a:rPr lang="en-US" dirty="0"/>
+              <a:t>F Measure = .980</a:t>
+            </a:r>
+          </a:p>
+          <a:p>
+            <a:pPr lvl="1"/>
+            <a:r>
+              <a:rPr lang="en-US" dirty="0"/>
+              <a:t>20 seconds to build model</a:t>
+            </a:r>
+          </a:p>
+          <a:p>
+            <a:pPr lvl="1"/>
+            <a:r>
+              <a:rPr lang="en-US" dirty="0"/>
+              <a:t>About 6 minutes to classify</a:t>
             </a:r>
           </a:p>
           <a:p>
@@ -3577,10 +3577,10 @@
       </p:sp>
       <p:pic>
         <p:nvPicPr>
-          <p:cNvPr id="5" name="Picture 4">
-            <a:extLst>
-              <a:ext uri="{FF2B5EF4-FFF2-40B4-BE49-F238E27FC236}">
-                <a16:creationId xmlns:a16="http://schemas.microsoft.com/office/drawing/2014/main" id="{AF0A2DAB-FF38-4752-8234-D31EE24D1740}"/>
+          <p:cNvPr id="2" name="Picture 1">
+            <a:extLst>
+              <a:ext uri="{FF2B5EF4-FFF2-40B4-BE49-F238E27FC236}">
+                <a16:creationId xmlns:a16="http://schemas.microsoft.com/office/drawing/2014/main" id="{9FA38AEA-0CB2-499D-9265-BA0DDF6541A3}"/>
               </a:ext>
             </a:extLst>
           </p:cNvPr>
@@ -3597,8 +3597,8 @@
         </p:blipFill>
         <p:spPr>
           <a:xfrm>
-            <a:off x="5933568" y="3019915"/>
-            <a:ext cx="5281312" cy="2242749"/>
+            <a:off x="5532233" y="3539892"/>
+            <a:ext cx="6427853" cy="2315624"/>
           </a:xfrm>
           <a:prstGeom prst="rect">
             <a:avLst/>
@@ -5011,28 +5011,28 @@
             <a:pPr lvl="1"/>
             <a:r>
               <a:rPr lang="en-US" dirty="0"/>
-              <a:t>66.9% correct classified, 33.1% incorrectly classified</a:t>
-            </a:r>
-          </a:p>
-          <a:p>
-            <a:pPr lvl="1"/>
-            <a:r>
-              <a:rPr lang="en-US" dirty="0"/>
-              <a:t>Precision = .663</a:t>
-            </a:r>
-          </a:p>
-          <a:p>
-            <a:pPr lvl="1"/>
-            <a:r>
-              <a:rPr lang="en-US" dirty="0"/>
-              <a:t>Recall = .669</a:t>
-            </a:r>
-          </a:p>
-          <a:p>
-            <a:pPr lvl="1"/>
-            <a:r>
-              <a:rPr lang="en-US" dirty="0"/>
-              <a:t>F Measure = .662</a:t>
+              <a:t>57.3% correct classified, 42.7% incorrectly classified</a:t>
+            </a:r>
+          </a:p>
+          <a:p>
+            <a:pPr lvl="1"/>
+            <a:r>
+              <a:rPr lang="en-US" dirty="0"/>
+              <a:t>Precision = .557</a:t>
+            </a:r>
+          </a:p>
+          <a:p>
+            <a:pPr lvl="1"/>
+            <a:r>
+              <a:rPr lang="en-US" dirty="0"/>
+              <a:t>Recall = .573</a:t>
+            </a:r>
+          </a:p>
+          <a:p>
+            <a:pPr lvl="1"/>
+            <a:r>
+              <a:rPr lang="en-US" dirty="0"/>
+              <a:t>F Measure = .558</a:t>
             </a:r>
           </a:p>
           <a:p>
@@ -5050,10 +5050,10 @@
       </p:sp>
       <p:pic>
         <p:nvPicPr>
-          <p:cNvPr id="4" name="Picture 3">
-            <a:extLst>
-              <a:ext uri="{FF2B5EF4-FFF2-40B4-BE49-F238E27FC236}">
-                <a16:creationId xmlns:a16="http://schemas.microsoft.com/office/drawing/2014/main" id="{5F5CAE99-9F6D-43F4-98BF-40F0CDBD1047}"/>
+          <p:cNvPr id="5" name="Picture 4">
+            <a:extLst>
+              <a:ext uri="{FF2B5EF4-FFF2-40B4-BE49-F238E27FC236}">
+                <a16:creationId xmlns:a16="http://schemas.microsoft.com/office/drawing/2014/main" id="{8DFD7746-2E2A-47A7-9646-7D5812AF15AB}"/>
               </a:ext>
             </a:extLst>
           </p:cNvPr>
@@ -5070,8 +5070,8 @@
         </p:blipFill>
         <p:spPr>
           <a:xfrm>
-            <a:off x="5098410" y="3418514"/>
-            <a:ext cx="6465664" cy="2758449"/>
+            <a:off x="4771506" y="3416847"/>
+            <a:ext cx="7304116" cy="2377723"/>
           </a:xfrm>
           <a:prstGeom prst="rect">
             <a:avLst/>
@@ -5138,14 +5138,14 @@
             <a:pPr lvl="1"/>
             <a:r>
               <a:rPr lang="en-US" dirty="0"/>
-              <a:t>35.3% correct classified, 64.7% incorrectly classified</a:t>
-            </a:r>
-          </a:p>
-          <a:p>
-            <a:pPr lvl="1"/>
-            <a:r>
-              <a:rPr lang="en-US" dirty="0"/>
-              <a:t>Recall = .353</a:t>
+              <a:t>29.2% correct classified, 70.8% incorrectly classified</a:t>
+            </a:r>
+          </a:p>
+          <a:p>
+            <a:pPr lvl="1"/>
+            <a:r>
+              <a:rPr lang="en-US" dirty="0"/>
+              <a:t>Recall = .292</a:t>
             </a:r>
           </a:p>
           <a:p>
@@ -5153,16 +5153,49 @@
             <a:r>
               <a:rPr lang="en-US" dirty="0"/>
               <a:t>Pretty bad…</a:t>
+            </a:r>
+          </a:p>
+        </p:txBody>
+      </p:sp>
+      <p:sp>
+        <p:nvSpPr>
+          <p:cNvPr id="5" name="Title 1">
+            <a:extLst>
+              <a:ext uri="{FF2B5EF4-FFF2-40B4-BE49-F238E27FC236}">
+                <a16:creationId xmlns:a16="http://schemas.microsoft.com/office/drawing/2014/main" id="{75B3FEB1-1A7B-49DC-A110-3BB00C12DF53}"/>
+              </a:ext>
+            </a:extLst>
+          </p:cNvPr>
+          <p:cNvSpPr>
+            <a:spLocks noGrp="1"/>
+          </p:cNvSpPr>
+          <p:nvPr>
+            <p:ph type="title"/>
+          </p:nvPr>
+        </p:nvSpPr>
+        <p:spPr>
+          <a:xfrm>
+            <a:off x="838200" y="365125"/>
+            <a:ext cx="10515600" cy="1325563"/>
+          </a:xfrm>
+        </p:spPr>
+        <p:txBody>
+          <a:bodyPr/>
+          <a:lstStyle/>
+          <a:p>
+            <a:r>
+              <a:rPr lang="en-US" dirty="0"/>
+              <a:t>Results of Classification</a:t>
             </a:r>
           </a:p>
         </p:txBody>
       </p:sp>
       <p:pic>
         <p:nvPicPr>
-          <p:cNvPr id="4" name="Picture 3">
-            <a:extLst>
-              <a:ext uri="{FF2B5EF4-FFF2-40B4-BE49-F238E27FC236}">
-                <a16:creationId xmlns:a16="http://schemas.microsoft.com/office/drawing/2014/main" id="{28F10048-E5A0-42FD-83E8-BF9DC03595C5}"/>
+          <p:cNvPr id="2" name="Picture 1">
+            <a:extLst>
+              <a:ext uri="{FF2B5EF4-FFF2-40B4-BE49-F238E27FC236}">
+                <a16:creationId xmlns:a16="http://schemas.microsoft.com/office/drawing/2014/main" id="{A7504D72-74B9-435D-A43B-515958D49785}"/>
               </a:ext>
             </a:extLst>
           </p:cNvPr>
@@ -5179,47 +5212,14 @@
         </p:blipFill>
         <p:spPr>
           <a:xfrm>
-            <a:off x="5510315" y="3429000"/>
-            <a:ext cx="5687522" cy="2343759"/>
+            <a:off x="3905163" y="3284565"/>
+            <a:ext cx="7984945" cy="2667348"/>
           </a:xfrm>
           <a:prstGeom prst="rect">
             <a:avLst/>
           </a:prstGeom>
         </p:spPr>
       </p:pic>
-      <p:sp>
-        <p:nvSpPr>
-          <p:cNvPr id="5" name="Title 1">
-            <a:extLst>
-              <a:ext uri="{FF2B5EF4-FFF2-40B4-BE49-F238E27FC236}">
-                <a16:creationId xmlns:a16="http://schemas.microsoft.com/office/drawing/2014/main" id="{75B3FEB1-1A7B-49DC-A110-3BB00C12DF53}"/>
-              </a:ext>
-            </a:extLst>
-          </p:cNvPr>
-          <p:cNvSpPr>
-            <a:spLocks noGrp="1"/>
-          </p:cNvSpPr>
-          <p:nvPr>
-            <p:ph type="title"/>
-          </p:nvPr>
-        </p:nvSpPr>
-        <p:spPr>
-          <a:xfrm>
-            <a:off x="838200" y="365125"/>
-            <a:ext cx="10515600" cy="1325563"/>
-          </a:xfrm>
-        </p:spPr>
-        <p:txBody>
-          <a:bodyPr/>
-          <a:lstStyle/>
-          <a:p>
-            <a:r>
-              <a:rPr lang="en-US" dirty="0"/>
-              <a:t>Results of Classification</a:t>
-            </a:r>
-          </a:p>
-        </p:txBody>
-      </p:sp>
     </p:spTree>
     <p:extLst>
       <p:ext uri="{BB962C8B-B14F-4D97-AF65-F5344CB8AC3E}">
@@ -5280,28 +5280,28 @@
             <a:pPr lvl="1"/>
             <a:r>
               <a:rPr lang="en-US" dirty="0"/>
-              <a:t>97.1% correct classified, 2.8% incorrectly classified</a:t>
-            </a:r>
-          </a:p>
-          <a:p>
-            <a:pPr lvl="1"/>
-            <a:r>
-              <a:rPr lang="en-US" dirty="0"/>
-              <a:t>Precision = .973</a:t>
-            </a:r>
-          </a:p>
-          <a:p>
-            <a:pPr lvl="1"/>
-            <a:r>
-              <a:rPr lang="en-US" dirty="0"/>
-              <a:t>Recall = .972</a:t>
-            </a:r>
-          </a:p>
-          <a:p>
-            <a:pPr lvl="1"/>
-            <a:r>
-              <a:rPr lang="en-US" dirty="0"/>
-              <a:t>F Measure = .971</a:t>
+              <a:t>96.2% correct classified, 3.8% incorrectly classified</a:t>
+            </a:r>
+          </a:p>
+          <a:p>
+            <a:pPr lvl="1"/>
+            <a:r>
+              <a:rPr lang="en-US" dirty="0"/>
+              <a:t>Precision = .964</a:t>
+            </a:r>
+          </a:p>
+          <a:p>
+            <a:pPr lvl="1"/>
+            <a:r>
+              <a:rPr lang="en-US" dirty="0"/>
+              <a:t>Recall = .962</a:t>
+            </a:r>
+          </a:p>
+          <a:p>
+            <a:pPr lvl="1"/>
+            <a:r>
+              <a:rPr lang="en-US" dirty="0"/>
+              <a:t>F Measure = .961</a:t>
             </a:r>
           </a:p>
           <a:p>
@@ -5351,10 +5351,10 @@
       </p:sp>
       <p:pic>
         <p:nvPicPr>
-          <p:cNvPr id="5" name="Picture 4">
-            <a:extLst>
-              <a:ext uri="{FF2B5EF4-FFF2-40B4-BE49-F238E27FC236}">
-                <a16:creationId xmlns:a16="http://schemas.microsoft.com/office/drawing/2014/main" id="{D17CE0D5-8784-4B5B-80CF-CF9F2BA473E2}"/>
+          <p:cNvPr id="2" name="Picture 1">
+            <a:extLst>
+              <a:ext uri="{FF2B5EF4-FFF2-40B4-BE49-F238E27FC236}">
+                <a16:creationId xmlns:a16="http://schemas.microsoft.com/office/drawing/2014/main" id="{55853F85-24B1-45F4-B33A-8466E40A5FCD}"/>
               </a:ext>
             </a:extLst>
           </p:cNvPr>
@@ -5371,8 +5371,8 @@
         </p:blipFill>
         <p:spPr>
           <a:xfrm>
-            <a:off x="5552211" y="3429000"/>
-            <a:ext cx="5524056" cy="2378413"/>
+            <a:off x="4236598" y="3429000"/>
+            <a:ext cx="7556674" cy="2513486"/>
           </a:xfrm>
           <a:prstGeom prst="rect">
             <a:avLst/>

</xml_diff>